<commit_message>
most recent slides. Used for module 1 videos
</commit_message>
<xml_diff>
--- a/module-0/ml4cybersec-premodule.pptx
+++ b/module-0/ml4cybersec-premodule.pptx
@@ -26,7 +26,7 @@
   <p:notesSz cx="6858000" cy="9144000"/>
   <p:embeddedFontLst>
     <p:embeddedFont>
-      <p:font typeface="Adobe Garamond Pro" panose="02020502060506020403" pitchFamily="18" charset="77"/>
+      <p:font typeface="Adobe Garamond Pro" panose="02020502060506020403" pitchFamily="18" charset="0"/>
       <p:regular r:id="rId14"/>
       <p:italic r:id="rId15"/>
     </p:embeddedFont>
@@ -249,7 +249,7 @@
           <a:p>
             <a:fld id="{9DAF894A-70DC-1344-8793-A2A3FB288CFE}" type="datetimeFigureOut">
               <a:rPr lang="en-US" smtClean="0"/>
-              <a:t>10/5/20</a:t>
+              <a:t>3/22/21</a:t>
             </a:fld>
             <a:endParaRPr lang="en-US"/>
           </a:p>
@@ -426,7 +426,7 @@
           <a:p>
             <a:fld id="{1FC4BE61-C03A-824C-A357-AB09725BFA9E}" type="datetimeFigureOut">
               <a:rPr lang="en-US" smtClean="0"/>
-              <a:t>10/5/20</a:t>
+              <a:t>3/22/21</a:t>
             </a:fld>
             <a:endParaRPr lang="en-US"/>
           </a:p>
@@ -906,80 +906,6 @@
           <a:lstStyle/>
           <a:p>
             <a:pPr rtl="0"/>
-            <a:r>
-              <a:rPr lang="en-US" sz="1200" b="0" i="0" u="none" strike="noStrike" kern="1200" dirty="0">
-                <a:solidFill>
-                  <a:schemeClr val="tx1"/>
-                </a:solidFill>
-                <a:effectLst/>
-                <a:latin typeface="+mn-lt"/>
-                <a:ea typeface="+mn-ea"/>
-                <a:cs typeface="+mn-cs"/>
-              </a:rPr>
-              <a:t>By the end of this program, learners will be able to:</a:t>
-            </a:r>
-            <a:endParaRPr lang="en-US" b="0" dirty="0">
-              <a:effectLst/>
-            </a:endParaRPr>
-          </a:p>
-          <a:p>
-            <a:pPr rtl="0"/>
-            <a:r>
-              <a:rPr lang="en-US" sz="1200" b="0" i="0" u="none" strike="noStrike" kern="1200" dirty="0">
-                <a:solidFill>
-                  <a:schemeClr val="tx1"/>
-                </a:solidFill>
-                <a:effectLst/>
-                <a:latin typeface="+mn-lt"/>
-                <a:ea typeface="+mn-ea"/>
-                <a:cs typeface="+mn-cs"/>
-              </a:rPr>
-              <a:t>* implement machine-learning models and select the best-performing model for various cybersecurity scenarios, such as malware classification, botnet detection, and intrusion detection.</a:t>
-            </a:r>
-            <a:endParaRPr lang="en-US" b="0" dirty="0">
-              <a:effectLst/>
-            </a:endParaRPr>
-          </a:p>
-          <a:p>
-            <a:pPr rtl="0"/>
-            <a:r>
-              <a:rPr lang="en-US" sz="1200" b="0" i="0" u="none" strike="noStrike" kern="1200" dirty="0">
-                <a:solidFill>
-                  <a:schemeClr val="tx1"/>
-                </a:solidFill>
-                <a:effectLst/>
-                <a:latin typeface="+mn-lt"/>
-                <a:ea typeface="+mn-ea"/>
-                <a:cs typeface="+mn-cs"/>
-              </a:rPr>
-              <a:t>* detect and defend against adversarial attacks on machine learning models at both their training and test times</a:t>
-            </a:r>
-            <a:endParaRPr lang="en-US" b="0" dirty="0">
-              <a:effectLst/>
-            </a:endParaRPr>
-          </a:p>
-          <a:p>
-            <a:pPr rtl="0"/>
-            <a:r>
-              <a:rPr lang="en-US" sz="1200" b="0" i="0" u="none" strike="noStrike" kern="1200" dirty="0">
-                <a:solidFill>
-                  <a:schemeClr val="tx1"/>
-                </a:solidFill>
-                <a:effectLst/>
-                <a:latin typeface="+mn-lt"/>
-                <a:ea typeface="+mn-ea"/>
-                <a:cs typeface="+mn-cs"/>
-              </a:rPr>
-              <a:t>* identify and propose means of navigating legal and ethical challenges that emerge from gathering data about human subjects and using it to build machine-learning models</a:t>
-            </a:r>
-            <a:endParaRPr lang="en-US" b="0" dirty="0">
-              <a:effectLst/>
-            </a:endParaRPr>
-          </a:p>
-          <a:p>
-            <a:br>
-              <a:rPr lang="en-US" dirty="0"/>
-            </a:br>
             <a:endParaRPr lang="en-US" dirty="0"/>
           </a:p>
         </p:txBody>
@@ -4330,58 +4256,101 @@
           <a:p>
             <a:r>
               <a:rPr lang="en-US" sz="2400" dirty="0"/>
-              <a:t>Understand machine learning concepts, know which model to apply given  datasets in the cybersecurity domain</a:t>
-            </a:r>
-          </a:p>
-          <a:p>
+              <a:t>Understand machine learning concepts, </a:t>
+            </a:r>
+            <a:r>
+              <a:rPr lang="en-US" sz="2400" b="1" dirty="0">
+                <a:solidFill>
+                  <a:srgbClr val="800000"/>
+                </a:solidFill>
+              </a:rPr>
+              <a:t>know which models to apply</a:t>
+            </a:r>
+            <a:r>
+              <a:rPr lang="en-US" sz="2400" b="1" dirty="0"/>
+              <a:t> </a:t>
+            </a:r>
             <a:r>
               <a:rPr lang="en-US" sz="2400" dirty="0"/>
-              <a:t>Extract data from various cybersecurity scenarios, implement and select machine learning models for network and computer security applications</a:t>
-            </a:r>
-          </a:p>
-          <a:p>
+              <a:t>given datasets in the cybersecurity domain</a:t>
+            </a:r>
+          </a:p>
+          <a:p>
+            <a:r>
+              <a:rPr lang="en-US" sz="2400" b="1" dirty="0">
+                <a:solidFill>
+                  <a:srgbClr val="800000"/>
+                </a:solidFill>
+              </a:rPr>
+              <a:t>Extract data</a:t>
+            </a:r>
+            <a:r>
+              <a:rPr lang="en-US" sz="2400" b="1" dirty="0"/>
+              <a:t> </a:t>
+            </a:r>
             <a:r>
               <a:rPr lang="en-US" sz="2400" dirty="0"/>
-              <a:t>Detect and defend against adversarial attacks on machine learning models at both their training and test times</a:t>
-            </a:r>
-          </a:p>
-          <a:p>
+              <a:t>from various cybersecurity scenarios, implement and </a:t>
+            </a:r>
+            <a:r>
+              <a:rPr lang="en-US" sz="2400" b="1" dirty="0">
+                <a:solidFill>
+                  <a:srgbClr val="800000"/>
+                </a:solidFill>
+              </a:rPr>
+              <a:t>select machine learning models</a:t>
+            </a:r>
             <a:r>
               <a:rPr lang="en-US" sz="2400" dirty="0"/>
-              <a:t>Identify and propose means of navigating legal and ethical challenges that emerge from gathering data about human subjects and using it to build machine-learning models</a:t>
+              <a:t> for network and computer security applications</a:t>
+            </a:r>
+          </a:p>
+          <a:p>
+            <a:r>
+              <a:rPr lang="en-US" sz="2400" b="1" dirty="0">
+                <a:solidFill>
+                  <a:srgbClr val="800000"/>
+                </a:solidFill>
+              </a:rPr>
+              <a:t>Detect </a:t>
+            </a:r>
+            <a:r>
+              <a:rPr lang="en-US" sz="2400" dirty="0"/>
+              <a:t>and</a:t>
+            </a:r>
+            <a:r>
+              <a:rPr lang="en-US" sz="2400" b="1" dirty="0">
+                <a:solidFill>
+                  <a:srgbClr val="800000"/>
+                </a:solidFill>
+              </a:rPr>
+              <a:t> defend against adversarial attacks</a:t>
+            </a:r>
+            <a:r>
+              <a:rPr lang="en-US" sz="2400" dirty="0"/>
+              <a:t> on machine learning models at both their training and test times</a:t>
+            </a:r>
+          </a:p>
+          <a:p>
+            <a:r>
+              <a:rPr lang="en-US" sz="2400" dirty="0"/>
+              <a:t>Identify and propose means of navigating </a:t>
+            </a:r>
+            <a:r>
+              <a:rPr lang="en-US" sz="2400" b="1" dirty="0">
+                <a:solidFill>
+                  <a:srgbClr val="800000"/>
+                </a:solidFill>
+              </a:rPr>
+              <a:t>legal and ethical challenges</a:t>
+            </a:r>
+            <a:r>
+              <a:rPr lang="en-US" sz="2400" dirty="0"/>
+              <a:t> that emerge from gathering data about human subjects and using it to build machine-learning models</a:t>
             </a:r>
           </a:p>
           <a:p>
             <a:endParaRPr lang="en-US" sz="2400" dirty="0"/>
-          </a:p>
-        </p:txBody>
-      </p:sp>
-      <p:sp>
-        <p:nvSpPr>
-          <p:cNvPr id="4" name="Slide Number Placeholder 3">
-            <a:extLst>
-              <a:ext uri="{FF2B5EF4-FFF2-40B4-BE49-F238E27FC236}">
-                <a16:creationId xmlns:a16="http://schemas.microsoft.com/office/drawing/2014/main" id="{710826A1-E1B7-5743-A0FB-29635DC386DF}"/>
-              </a:ext>
-            </a:extLst>
-          </p:cNvPr>
-          <p:cNvSpPr>
-            <a:spLocks noGrp="1"/>
-          </p:cNvSpPr>
-          <p:nvPr>
-            <p:ph type="sldNum" sz="quarter" idx="12"/>
-          </p:nvPr>
-        </p:nvSpPr>
-        <p:spPr/>
-        <p:txBody>
-          <a:bodyPr/>
-          <a:lstStyle/>
-          <a:p>
-            <a:fld id="{256CE055-ECFD-9048-9FD8-7E2D8656A4F7}" type="slidenum">
-              <a:rPr lang="en-US" smtClean="0"/>
-              <a:t>6</a:t>
-            </a:fld>
-            <a:endParaRPr lang="en-US" dirty="0"/>
           </a:p>
         </p:txBody>
       </p:sp>

</xml_diff>